<commit_message>
Revise presentation with colorful detailed slides
</commit_message>
<xml_diff>
--- a/reports/Regression_Project_Presentation.pptx
+++ b/reports/Regression_Project_Presentation.pptx
@@ -20,6 +20,9 @@
     <p:sldId id="268" r:id="rId19"/>
     <p:sldId id="269" r:id="rId20"/>
     <p:sldId id="270" r:id="rId21"/>
+    <p:sldId id="271" r:id="rId22"/>
+    <p:sldId id="272" r:id="rId23"/>
+    <p:sldId id="273" r:id="rId24"/>
   </p:sldIdLst>
   <p:sldSz cx="9144000" cy="6858000" type="screen4x3"/>
   <p:notesSz cx="6858000" cy="9144000"/>
@@ -3116,30 +3119,76 @@
         <p:txBody>
           <a:bodyPr/>
           <a:lstStyle/>
-          <a:p>
-            <a:r>
+          <a:p/>
+        </p:txBody>
+      </p:sp>
+      <p:sp>
+        <p:nvSpPr>
+          <p:cNvPr id="3" name="Subtitle 2"/>
+          <p:cNvSpPr>
+            <a:spLocks noGrp="1"/>
+          </p:cNvSpPr>
+          <p:nvPr>
+            <p:ph type="subTitle" idx="1"/>
+          </p:nvPr>
+        </p:nvSpPr>
+        <p:spPr/>
+        <p:txBody>
+          <a:bodyPr/>
+          <a:lstStyle/>
+          <a:p>
+            <a:r>
+              <a:t>Paul Lopes | Regression Methods | November 28, 2025</a:t>
+            </a:r>
+          </a:p>
+        </p:txBody>
+      </p:sp>
+      <p:sp>
+        <p:nvSpPr>
+          <p:cNvPr id="4" name="Rectangle 3"/>
+          <p:cNvSpPr/>
+          <p:nvPr/>
+        </p:nvSpPr>
+        <p:spPr>
+          <a:xfrm>
+            <a:off x="0" y="0"/>
+            <a:ext cx="12188952" cy="1097280"/>
+          </a:xfrm>
+          <a:prstGeom prst="rect">
+            <a:avLst/>
+          </a:prstGeom>
+          <a:solidFill>
+            <a:srgbClr val="08347D"/>
+          </a:solidFill>
+          <a:ln>
+            <a:noFill/>
+          </a:ln>
+        </p:spPr>
+        <p:style>
+          <a:lnRef idx="1">
+            <a:schemeClr val="accent1"/>
+          </a:lnRef>
+          <a:fillRef idx="3">
+            <a:schemeClr val="accent1"/>
+          </a:fillRef>
+          <a:effectRef idx="2">
+            <a:schemeClr val="accent1"/>
+          </a:effectRef>
+          <a:fontRef idx="minor">
+            <a:schemeClr val="lt1"/>
+          </a:fontRef>
+        </p:style>
+        <p:txBody>
+          <a:bodyPr rtlCol="0" anchor="ctr"/>
+          <a:lstStyle/>
+          <a:p>
+            <a:r>
+              <a:rPr b="1" sz="2800">
+                <a:solidFill>
+                  <a:srgbClr val="FFFFFF"/>
+                </a:solidFill>
+              </a:rPr>
               <a:t>S&amp;P 500 Stock Regression Project</a:t>
-            </a:r>
-          </a:p>
-        </p:txBody>
-      </p:sp>
-      <p:sp>
-        <p:nvSpPr>
-          <p:cNvPr id="3" name="Subtitle 2"/>
-          <p:cNvSpPr>
-            <a:spLocks noGrp="1"/>
-          </p:cNvSpPr>
-          <p:nvPr>
-            <p:ph type="subTitle" idx="1"/>
-          </p:nvPr>
-        </p:nvSpPr>
-        <p:spPr/>
-        <p:txBody>
-          <a:bodyPr/>
-          <a:lstStyle/>
-          <a:p>
-            <a:r>
-              <a:t>Paul Lopes | Regression Methods | Nov 28, 2025</a:t>
             </a:r>
           </a:p>
         </p:txBody>
@@ -3176,24 +3225,70 @@
         <p:txBody>
           <a:bodyPr/>
           <a:lstStyle/>
-          <a:p>
-            <a:r>
-              <a:t>Coefficient Estimates</a:t>
+          <a:p/>
+        </p:txBody>
+      </p:sp>
+      <p:sp>
+        <p:nvSpPr>
+          <p:cNvPr id="3" name="Rectangle 2"/>
+          <p:cNvSpPr/>
+          <p:nvPr/>
+        </p:nvSpPr>
+        <p:spPr>
+          <a:xfrm>
+            <a:off x="0" y="0"/>
+            <a:ext cx="12188952" cy="1097280"/>
+          </a:xfrm>
+          <a:prstGeom prst="rect">
+            <a:avLst/>
+          </a:prstGeom>
+          <a:solidFill>
+            <a:srgbClr val="08347D"/>
+          </a:solidFill>
+          <a:ln>
+            <a:noFill/>
+          </a:ln>
+        </p:spPr>
+        <p:style>
+          <a:lnRef idx="1">
+            <a:schemeClr val="accent1"/>
+          </a:lnRef>
+          <a:fillRef idx="3">
+            <a:schemeClr val="accent1"/>
+          </a:fillRef>
+          <a:effectRef idx="2">
+            <a:schemeClr val="accent1"/>
+          </a:effectRef>
+          <a:fontRef idx="minor">
+            <a:schemeClr val="lt1"/>
+          </a:fontRef>
+        </p:style>
+        <p:txBody>
+          <a:bodyPr rtlCol="0" anchor="ctr"/>
+          <a:lstStyle/>
+          <a:p>
+            <a:r>
+              <a:rPr b="1" sz="2800">
+                <a:solidFill>
+                  <a:srgbClr val="FFFFFF"/>
+                </a:solidFill>
+              </a:rPr>
+              <a:t>Results: Coefficient Estimates</a:t>
             </a:r>
           </a:p>
         </p:txBody>
       </p:sp>
       <p:graphicFrame>
         <p:nvGraphicFramePr>
-          <p:cNvPr id="3" name="Table 2"/>
+          <p:cNvPr id="4" name="Table 3"/>
           <p:cNvGraphicFramePr>
             <a:graphicFrameLocks noGrp="1"/>
           </p:cNvGraphicFramePr>
           <p:nvPr/>
         </p:nvGraphicFramePr>
         <p:xfrm>
-          <a:off x="365760" y="1371600"/>
-          <a:ext cx="8412480" cy="3474720"/>
+          <a:off x="365760" y="1554480"/>
+          <a:ext cx="8321040" cy="3291840"/>
         </p:xfrm>
         <a:graphic>
           <a:graphicData uri="http://schemas.openxmlformats.org/drawingml/2006/table">
@@ -3202,11 +3297,11 @@
                 <a:tableStyleId>{5C22544A-7EE6-4342-B048-85BDC9FD1C3A}</a:tableStyleId>
               </a:tblPr>
               <a:tblGrid>
-                <a:gridCol w="2804160"/>
-                <a:gridCol w="2804160"/>
-                <a:gridCol w="2804160"/>
+                <a:gridCol w="2773680"/>
+                <a:gridCol w="2773680"/>
+                <a:gridCol w="2773680"/>
               </a:tblGrid>
-              <a:tr h="579120">
+              <a:tr h="548640">
                 <a:tc>
                   <a:txBody>
                     <a:bodyPr/>
@@ -3244,7 +3339,7 @@
                   <a:tcPr/>
                 </a:tc>
               </a:tr>
-              <a:tr h="579120">
+              <a:tr h="548640">
                 <a:tc>
                   <a:txBody>
                     <a:bodyPr/>
@@ -3282,7 +3377,7 @@
                   <a:tcPr/>
                 </a:tc>
               </a:tr>
-              <a:tr h="579120">
+              <a:tr h="548640">
                 <a:tc>
                   <a:txBody>
                     <a:bodyPr/>
@@ -3320,7 +3415,7 @@
                   <a:tcPr/>
                 </a:tc>
               </a:tr>
-              <a:tr h="579120">
+              <a:tr h="548640">
                 <a:tc>
                   <a:txBody>
                     <a:bodyPr/>
@@ -3358,7 +3453,7 @@
                   <a:tcPr/>
                 </a:tc>
               </a:tr>
-              <a:tr h="579120">
+              <a:tr h="548640">
                 <a:tc>
                   <a:txBody>
                     <a:bodyPr/>
@@ -3396,7 +3491,7 @@
                   <a:tcPr/>
                 </a:tc>
               </a:tr>
-              <a:tr h="579120">
+              <a:tr h="548640">
                 <a:tc>
                   <a:txBody>
                     <a:bodyPr/>
@@ -3465,7 +3560,7 @@
         <p:spPr>
           <a:xfrm>
             <a:off x="457200" y="182880"/>
-            <a:ext cx="8229600" cy="548640"/>
+            <a:ext cx="8686800" cy="640080"/>
           </a:xfrm>
           <a:prstGeom prst="rect">
             <a:avLst/>
@@ -3479,6 +3574,7 @@
           <a:lstStyle/>
           <a:p>
             <a:r>
+              <a:rPr b="1" sz="2400"/>
               <a:t>Diagnostic: Residuals vs Fitted</a:t>
             </a:r>
           </a:p>
@@ -3501,7 +3597,7 @@
         <p:spPr>
           <a:xfrm>
             <a:off x="914400" y="822960"/>
-            <a:ext cx="6446520" cy="4297680"/>
+            <a:ext cx="6583680" cy="4389120"/>
           </a:xfrm>
           <a:prstGeom prst="rect">
             <a:avLst/>
@@ -3535,7 +3631,7 @@
         <p:spPr>
           <a:xfrm>
             <a:off x="457200" y="182880"/>
-            <a:ext cx="8229600" cy="548640"/>
+            <a:ext cx="8686800" cy="640080"/>
           </a:xfrm>
           <a:prstGeom prst="rect">
             <a:avLst/>
@@ -3549,6 +3645,7 @@
           <a:lstStyle/>
           <a:p>
             <a:r>
+              <a:rPr b="1" sz="2400"/>
               <a:t>Diagnostic: Normal Q-Q</a:t>
             </a:r>
           </a:p>
@@ -3571,7 +3668,7 @@
         <p:spPr>
           <a:xfrm>
             <a:off x="914400" y="822960"/>
-            <a:ext cx="6446520" cy="4297680"/>
+            <a:ext cx="6583680" cy="4389120"/>
           </a:xfrm>
           <a:prstGeom prst="rect">
             <a:avLst/>
@@ -3610,11 +3707,7 @@
         <p:txBody>
           <a:bodyPr/>
           <a:lstStyle/>
-          <a:p>
-            <a:r>
-              <a:t>Key Takeaways</a:t>
-            </a:r>
-          </a:p>
+          <a:p/>
         </p:txBody>
       </p:sp>
       <p:sp>
@@ -3634,22 +3727,72 @@
           <a:p/>
           <a:p>
             <a:r>
-              <a:t>Momentum dominates: stronger early-year trends → higher annual returns</a:t>
-            </a:r>
-          </a:p>
-          <a:p>
-            <a:r>
-              <a:t>Volatility negatively related to returns; stability rewarded</a:t>
-            </a:r>
-          </a:p>
-          <a:p>
-            <a:r>
-              <a:t>Volume and short-term MA trend add limited incremental signal</a:t>
-            </a:r>
-          </a:p>
-          <a:p>
-            <a:r>
-              <a:t>Model captures &gt;50% of return variation with simple technical inputs</a:t>
+              <a:t>Momentum signal indicates trend persistence across large caps.</a:t>
+            </a:r>
+          </a:p>
+          <a:p>
+            <a:r>
+              <a:t>Negative volatility coefficient suggests stability premium in 2017.</a:t>
+            </a:r>
+          </a:p>
+          <a:p>
+            <a:r>
+              <a:t>Volume and MA trend become redundant once momentum is included.</a:t>
+            </a:r>
+          </a:p>
+          <a:p>
+            <a:r>
+              <a:t>Model provides practical screening tool with interpretable coefficients.</a:t>
+            </a:r>
+          </a:p>
+        </p:txBody>
+      </p:sp>
+      <p:sp>
+        <p:nvSpPr>
+          <p:cNvPr id="4" name="Rectangle 3"/>
+          <p:cNvSpPr/>
+          <p:nvPr/>
+        </p:nvSpPr>
+        <p:spPr>
+          <a:xfrm>
+            <a:off x="0" y="0"/>
+            <a:ext cx="12188952" cy="1097280"/>
+          </a:xfrm>
+          <a:prstGeom prst="rect">
+            <a:avLst/>
+          </a:prstGeom>
+          <a:solidFill>
+            <a:srgbClr val="08347D"/>
+          </a:solidFill>
+          <a:ln>
+            <a:noFill/>
+          </a:ln>
+        </p:spPr>
+        <p:style>
+          <a:lnRef idx="1">
+            <a:schemeClr val="accent1"/>
+          </a:lnRef>
+          <a:fillRef idx="3">
+            <a:schemeClr val="accent1"/>
+          </a:fillRef>
+          <a:effectRef idx="2">
+            <a:schemeClr val="accent1"/>
+          </a:effectRef>
+          <a:fontRef idx="minor">
+            <a:schemeClr val="lt1"/>
+          </a:fontRef>
+        </p:style>
+        <p:txBody>
+          <a:bodyPr rtlCol="0" anchor="ctr"/>
+          <a:lstStyle/>
+          <a:p>
+            <a:r>
+              <a:rPr b="1" sz="2800">
+                <a:solidFill>
+                  <a:srgbClr val="FFFFFF"/>
+                </a:solidFill>
+              </a:rPr>
+              <a:t>Discussion (What does it mean?)</a:t>
             </a:r>
           </a:p>
         </p:txBody>
@@ -3686,11 +3829,7 @@
         <p:txBody>
           <a:bodyPr/>
           <a:lstStyle/>
-          <a:p>
-            <a:r>
-              <a:t>Limitations &amp; Next Steps</a:t>
-            </a:r>
-          </a:p>
+          <a:p/>
         </p:txBody>
       </p:sp>
       <p:sp>
@@ -3710,22 +3849,72 @@
           <a:p/>
           <a:p>
             <a:r>
-              <a:t>Single-year horizon—extend to multi-year panel to test stability</a:t>
-            </a:r>
-          </a:p>
-          <a:p>
-            <a:r>
-              <a:t>No sector fixed effects or macro controls—add in future work</a:t>
-            </a:r>
-          </a:p>
-          <a:p>
-            <a:r>
-              <a:t>Explore LASSO, tree ensembles, or interaction terms</a:t>
-            </a:r>
-          </a:p>
-          <a:p>
-            <a:r>
-              <a:t>Integrate fundamental factors (valuation, profitability)</a:t>
+              <a:t>Single-year window—extend to multi-year rolling regressions.</a:t>
+            </a:r>
+          </a:p>
+          <a:p>
+            <a:r>
+              <a:t>No sector controls—add dummy variables for finer interpretation.</a:t>
+            </a:r>
+          </a:p>
+          <a:p>
+            <a:r>
+              <a:t>Assume linearity—evaluate LASSO or Random Forest.</a:t>
+            </a:r>
+          </a:p>
+          <a:p>
+            <a:r>
+              <a:t>Incorporate fundamentals (valuation, profitability) for richer models.</a:t>
+            </a:r>
+          </a:p>
+        </p:txBody>
+      </p:sp>
+      <p:sp>
+        <p:nvSpPr>
+          <p:cNvPr id="4" name="Rectangle 3"/>
+          <p:cNvSpPr/>
+          <p:nvPr/>
+        </p:nvSpPr>
+        <p:spPr>
+          <a:xfrm>
+            <a:off x="0" y="0"/>
+            <a:ext cx="12188952" cy="1097280"/>
+          </a:xfrm>
+          <a:prstGeom prst="rect">
+            <a:avLst/>
+          </a:prstGeom>
+          <a:solidFill>
+            <a:srgbClr val="08347D"/>
+          </a:solidFill>
+          <a:ln>
+            <a:noFill/>
+          </a:ln>
+        </p:spPr>
+        <p:style>
+          <a:lnRef idx="1">
+            <a:schemeClr val="accent1"/>
+          </a:lnRef>
+          <a:fillRef idx="3">
+            <a:schemeClr val="accent1"/>
+          </a:fillRef>
+          <a:effectRef idx="2">
+            <a:schemeClr val="accent1"/>
+          </a:effectRef>
+          <a:fontRef idx="minor">
+            <a:schemeClr val="lt1"/>
+          </a:fontRef>
+        </p:style>
+        <p:txBody>
+          <a:bodyPr rtlCol="0" anchor="ctr"/>
+          <a:lstStyle/>
+          <a:p>
+            <a:r>
+              <a:rPr b="1" sz="2800">
+                <a:solidFill>
+                  <a:srgbClr val="FFFFFF"/>
+                </a:solidFill>
+              </a:rPr>
+              <a:t>Limitations &amp; Future Work</a:t>
             </a:r>
           </a:p>
         </p:txBody>
@@ -3762,11 +3951,7 @@
         <p:txBody>
           <a:bodyPr/>
           <a:lstStyle/>
-          <a:p>
-            <a:r>
-              <a:t>References &amp; Access</a:t>
-            </a:r>
-          </a:p>
+          <a:p/>
         </p:txBody>
       </p:sp>
       <p:sp>
@@ -3786,22 +3971,418 @@
           <a:p/>
           <a:p>
             <a:r>
-              <a:t>Cam Nugent. "S&amp;P 500 Stock Data", Kaggle (Accessed Nov 2025).</a:t>
-            </a:r>
-          </a:p>
-          <a:p>
-            <a:r>
-              <a:t>Jegadeesh &amp; Titman (1993). Returns to buying winners and selling losers.</a:t>
-            </a:r>
-          </a:p>
-          <a:p>
-            <a:r>
-              <a:t>Repository: https://github.com/paullopes2004/RegressionCourseProject</a:t>
-            </a:r>
-          </a:p>
-          <a:p>
-            <a:r>
-              <a:t>Contact: Paul Lopes (paullopes@iu.edu)</a:t>
+              <a:t>Cam Nugent for Kaggle dataset.</a:t>
+            </a:r>
+          </a:p>
+          <a:p>
+            <a:r>
+              <a:t>Regression Methods instructor for guidance.</a:t>
+            </a:r>
+          </a:p>
+          <a:p>
+            <a:r>
+              <a:t>ChatGPT (OpenAI GPT-5.1 Codex) for scripting/document support (cited).</a:t>
+            </a:r>
+          </a:p>
+        </p:txBody>
+      </p:sp>
+      <p:sp>
+        <p:nvSpPr>
+          <p:cNvPr id="4" name="Rectangle 3"/>
+          <p:cNvSpPr/>
+          <p:nvPr/>
+        </p:nvSpPr>
+        <p:spPr>
+          <a:xfrm>
+            <a:off x="0" y="0"/>
+            <a:ext cx="12188952" cy="1097280"/>
+          </a:xfrm>
+          <a:prstGeom prst="rect">
+            <a:avLst/>
+          </a:prstGeom>
+          <a:solidFill>
+            <a:srgbClr val="08347D"/>
+          </a:solidFill>
+          <a:ln>
+            <a:noFill/>
+          </a:ln>
+        </p:spPr>
+        <p:style>
+          <a:lnRef idx="1">
+            <a:schemeClr val="accent1"/>
+          </a:lnRef>
+          <a:fillRef idx="3">
+            <a:schemeClr val="accent1"/>
+          </a:fillRef>
+          <a:effectRef idx="2">
+            <a:schemeClr val="accent1"/>
+          </a:effectRef>
+          <a:fontRef idx="minor">
+            <a:schemeClr val="lt1"/>
+          </a:fontRef>
+        </p:style>
+        <p:txBody>
+          <a:bodyPr rtlCol="0" anchor="ctr"/>
+          <a:lstStyle/>
+          <a:p>
+            <a:r>
+              <a:rPr b="1" sz="2800">
+                <a:solidFill>
+                  <a:srgbClr val="FFFFFF"/>
+                </a:solidFill>
+              </a:rPr>
+              <a:t>Acknowledgments</a:t>
+            </a:r>
+          </a:p>
+        </p:txBody>
+      </p:sp>
+    </p:spTree>
+  </p:cSld>
+  <p:clrMapOvr>
+    <a:masterClrMapping/>
+  </p:clrMapOvr>
+</p:sld>
+</file>
+
+<file path=ppt/slides/slide16.xml><?xml version="1.0" encoding="utf-8"?>
+<p:sld xmlns:a="http://schemas.openxmlformats.org/drawingml/2006/main" xmlns:p="http://schemas.openxmlformats.org/presentationml/2006/main" xmlns:r="http://schemas.openxmlformats.org/officeDocument/2006/relationships">
+  <p:cSld>
+    <p:spTree>
+      <p:nvGrpSpPr>
+        <p:cNvPr id="1" name=""/>
+        <p:cNvGrpSpPr/>
+        <p:nvPr/>
+      </p:nvGrpSpPr>
+      <p:grpSpPr/>
+      <p:sp>
+        <p:nvSpPr>
+          <p:cNvPr id="2" name="Title 1"/>
+          <p:cNvSpPr>
+            <a:spLocks noGrp="1"/>
+          </p:cNvSpPr>
+          <p:nvPr>
+            <p:ph type="title"/>
+          </p:nvPr>
+        </p:nvSpPr>
+        <p:spPr/>
+        <p:txBody>
+          <a:bodyPr/>
+          <a:lstStyle/>
+          <a:p/>
+        </p:txBody>
+      </p:sp>
+      <p:sp>
+        <p:nvSpPr>
+          <p:cNvPr id="3" name="Content Placeholder 2"/>
+          <p:cNvSpPr>
+            <a:spLocks noGrp="1"/>
+          </p:cNvSpPr>
+          <p:nvPr>
+            <p:ph idx="1"/>
+          </p:nvPr>
+        </p:nvSpPr>
+        <p:spPr/>
+        <p:txBody>
+          <a:bodyPr/>
+          <a:lstStyle/>
+          <a:p/>
+          <a:p>
+            <a:r>
+              <a:t>Cam Nugent (2025). "S&amp;P 500 Stock Data", Kaggle.</a:t>
+            </a:r>
+          </a:p>
+          <a:p>
+            <a:r>
+              <a:t>Jegadeesh, N. &amp; Titman, S. (1993). Returns to buying winners and selling losers.</a:t>
+            </a:r>
+          </a:p>
+        </p:txBody>
+      </p:sp>
+      <p:sp>
+        <p:nvSpPr>
+          <p:cNvPr id="4" name="Rectangle 3"/>
+          <p:cNvSpPr/>
+          <p:nvPr/>
+        </p:nvSpPr>
+        <p:spPr>
+          <a:xfrm>
+            <a:off x="0" y="0"/>
+            <a:ext cx="12188952" cy="1097280"/>
+          </a:xfrm>
+          <a:prstGeom prst="rect">
+            <a:avLst/>
+          </a:prstGeom>
+          <a:solidFill>
+            <a:srgbClr val="08347D"/>
+          </a:solidFill>
+          <a:ln>
+            <a:noFill/>
+          </a:ln>
+        </p:spPr>
+        <p:style>
+          <a:lnRef idx="1">
+            <a:schemeClr val="accent1"/>
+          </a:lnRef>
+          <a:fillRef idx="3">
+            <a:schemeClr val="accent1"/>
+          </a:fillRef>
+          <a:effectRef idx="2">
+            <a:schemeClr val="accent1"/>
+          </a:effectRef>
+          <a:fontRef idx="minor">
+            <a:schemeClr val="lt1"/>
+          </a:fontRef>
+        </p:style>
+        <p:txBody>
+          <a:bodyPr rtlCol="0" anchor="ctr"/>
+          <a:lstStyle/>
+          <a:p>
+            <a:r>
+              <a:rPr b="1" sz="2800">
+                <a:solidFill>
+                  <a:srgbClr val="FFFFFF"/>
+                </a:solidFill>
+              </a:rPr>
+              <a:t>Literature Cited</a:t>
+            </a:r>
+          </a:p>
+        </p:txBody>
+      </p:sp>
+    </p:spTree>
+  </p:cSld>
+  <p:clrMapOvr>
+    <a:masterClrMapping/>
+  </p:clrMapOvr>
+</p:sld>
+</file>
+
+<file path=ppt/slides/slide17.xml><?xml version="1.0" encoding="utf-8"?>
+<p:sld xmlns:a="http://schemas.openxmlformats.org/drawingml/2006/main" xmlns:p="http://schemas.openxmlformats.org/presentationml/2006/main" xmlns:r="http://schemas.openxmlformats.org/officeDocument/2006/relationships">
+  <p:cSld>
+    <p:spTree>
+      <p:nvGrpSpPr>
+        <p:cNvPr id="1" name=""/>
+        <p:cNvGrpSpPr/>
+        <p:nvPr/>
+      </p:nvGrpSpPr>
+      <p:grpSpPr/>
+      <p:sp>
+        <p:nvSpPr>
+          <p:cNvPr id="2" name="Title 1"/>
+          <p:cNvSpPr>
+            <a:spLocks noGrp="1"/>
+          </p:cNvSpPr>
+          <p:nvPr>
+            <p:ph type="title"/>
+          </p:nvPr>
+        </p:nvSpPr>
+        <p:spPr/>
+        <p:txBody>
+          <a:bodyPr/>
+          <a:lstStyle/>
+          <a:p/>
+        </p:txBody>
+      </p:sp>
+      <p:sp>
+        <p:nvSpPr>
+          <p:cNvPr id="3" name="Content Placeholder 2"/>
+          <p:cNvSpPr>
+            <a:spLocks noGrp="1"/>
+          </p:cNvSpPr>
+          <p:nvPr>
+            <p:ph idx="1"/>
+          </p:nvPr>
+        </p:nvSpPr>
+        <p:spPr/>
+        <p:txBody>
+          <a:bodyPr/>
+          <a:lstStyle/>
+          <a:p/>
+          <a:p>
+            <a:r>
+              <a:t>Appendix A: scripts/sp500_regression.R</a:t>
+            </a:r>
+          </a:p>
+          <a:p>
+            <a:r>
+              <a:t>Appendix B: outputs/ (coefficients, metrics, residuals)</a:t>
+            </a:r>
+          </a:p>
+          <a:p>
+            <a:r>
+              <a:t>Appendix C: figures/ (diagnostic PNGs)</a:t>
+            </a:r>
+          </a:p>
+          <a:p>
+            <a:r>
+              <a:t>Data URL: https://www.kaggle.com/datasets/camnugent/sandp500</a:t>
+            </a:r>
+          </a:p>
+        </p:txBody>
+      </p:sp>
+      <p:sp>
+        <p:nvSpPr>
+          <p:cNvPr id="4" name="Rectangle 3"/>
+          <p:cNvSpPr/>
+          <p:nvPr/>
+        </p:nvSpPr>
+        <p:spPr>
+          <a:xfrm>
+            <a:off x="0" y="0"/>
+            <a:ext cx="12188952" cy="1097280"/>
+          </a:xfrm>
+          <a:prstGeom prst="rect">
+            <a:avLst/>
+          </a:prstGeom>
+          <a:solidFill>
+            <a:srgbClr val="08347D"/>
+          </a:solidFill>
+          <a:ln>
+            <a:noFill/>
+          </a:ln>
+        </p:spPr>
+        <p:style>
+          <a:lnRef idx="1">
+            <a:schemeClr val="accent1"/>
+          </a:lnRef>
+          <a:fillRef idx="3">
+            <a:schemeClr val="accent1"/>
+          </a:fillRef>
+          <a:effectRef idx="2">
+            <a:schemeClr val="accent1"/>
+          </a:effectRef>
+          <a:fontRef idx="minor">
+            <a:schemeClr val="lt1"/>
+          </a:fontRef>
+        </p:style>
+        <p:txBody>
+          <a:bodyPr rtlCol="0" anchor="ctr"/>
+          <a:lstStyle/>
+          <a:p>
+            <a:r>
+              <a:rPr b="1" sz="2800">
+                <a:solidFill>
+                  <a:srgbClr val="FFFFFF"/>
+                </a:solidFill>
+              </a:rPr>
+              <a:t>Appendices &amp; Extras</a:t>
+            </a:r>
+          </a:p>
+        </p:txBody>
+      </p:sp>
+    </p:spTree>
+  </p:cSld>
+  <p:clrMapOvr>
+    <a:masterClrMapping/>
+  </p:clrMapOvr>
+</p:sld>
+</file>
+
+<file path=ppt/slides/slide18.xml><?xml version="1.0" encoding="utf-8"?>
+<p:sld xmlns:a="http://schemas.openxmlformats.org/drawingml/2006/main" xmlns:p="http://schemas.openxmlformats.org/presentationml/2006/main" xmlns:r="http://schemas.openxmlformats.org/officeDocument/2006/relationships">
+  <p:cSld>
+    <p:spTree>
+      <p:nvGrpSpPr>
+        <p:cNvPr id="1" name=""/>
+        <p:cNvGrpSpPr/>
+        <p:nvPr/>
+      </p:nvGrpSpPr>
+      <p:grpSpPr/>
+      <p:sp>
+        <p:nvSpPr>
+          <p:cNvPr id="2" name="Title 1"/>
+          <p:cNvSpPr>
+            <a:spLocks noGrp="1"/>
+          </p:cNvSpPr>
+          <p:nvPr>
+            <p:ph type="title"/>
+          </p:nvPr>
+        </p:nvSpPr>
+        <p:spPr/>
+        <p:txBody>
+          <a:bodyPr/>
+          <a:lstStyle/>
+          <a:p/>
+        </p:txBody>
+      </p:sp>
+      <p:sp>
+        <p:nvSpPr>
+          <p:cNvPr id="3" name="Content Placeholder 2"/>
+          <p:cNvSpPr>
+            <a:spLocks noGrp="1"/>
+          </p:cNvSpPr>
+          <p:nvPr>
+            <p:ph idx="1"/>
+          </p:nvPr>
+        </p:nvSpPr>
+        <p:spPr/>
+        <p:txBody>
+          <a:bodyPr/>
+          <a:lstStyle/>
+          <a:p/>
+          <a:p>
+            <a:r>
+              <a:t>GitHub Repo: https://github.com/paullopes2004/RegressionCourseProject</a:t>
+            </a:r>
+          </a:p>
+          <a:p>
+            <a:r>
+              <a:t>Email: paullopes@iu.edu</a:t>
+            </a:r>
+          </a:p>
+          <a:p>
+            <a:r>
+              <a:t>Collaborator: abarvalia369 (invited)</a:t>
+            </a:r>
+          </a:p>
+        </p:txBody>
+      </p:sp>
+      <p:sp>
+        <p:nvSpPr>
+          <p:cNvPr id="4" name="Rectangle 3"/>
+          <p:cNvSpPr/>
+          <p:nvPr/>
+        </p:nvSpPr>
+        <p:spPr>
+          <a:xfrm>
+            <a:off x="0" y="0"/>
+            <a:ext cx="12188952" cy="1097280"/>
+          </a:xfrm>
+          <a:prstGeom prst="rect">
+            <a:avLst/>
+          </a:prstGeom>
+          <a:solidFill>
+            <a:srgbClr val="08347D"/>
+          </a:solidFill>
+          <a:ln>
+            <a:noFill/>
+          </a:ln>
+        </p:spPr>
+        <p:style>
+          <a:lnRef idx="1">
+            <a:schemeClr val="accent1"/>
+          </a:lnRef>
+          <a:fillRef idx="3">
+            <a:schemeClr val="accent1"/>
+          </a:fillRef>
+          <a:effectRef idx="2">
+            <a:schemeClr val="accent1"/>
+          </a:effectRef>
+          <a:fontRef idx="minor">
+            <a:schemeClr val="lt1"/>
+          </a:fontRef>
+        </p:style>
+        <p:txBody>
+          <a:bodyPr rtlCol="0" anchor="ctr"/>
+          <a:lstStyle/>
+          <a:p>
+            <a:r>
+              <a:rPr b="1" sz="2800">
+                <a:solidFill>
+                  <a:srgbClr val="FFFFFF"/>
+                </a:solidFill>
+              </a:rPr>
+              <a:t>Access &amp; Contact</a:t>
             </a:r>
           </a:p>
         </p:txBody>
@@ -3838,11 +4419,7 @@
         <p:txBody>
           <a:bodyPr/>
           <a:lstStyle/>
-          <a:p>
-            <a:r>
-              <a:t>Agenda</a:t>
-            </a:r>
-          </a:p>
+          <a:p/>
         </p:txBody>
       </p:sp>
       <p:sp>
@@ -3861,28 +4438,77 @@
           <a:lstStyle/>
           <a:p/>
           <a:p>
-            <a:r>
-              <a:t>Project Overview &amp; Research Question</a:t>
-            </a:r>
-          </a:p>
-          <a:p>
-            <a:r>
-              <a:t>Data and Feature Engineering</a:t>
-            </a:r>
-          </a:p>
-          <a:p>
-            <a:r>
-              <a:t>Regression Model</a:t>
-            </a:r>
-          </a:p>
-          <a:p>
-            <a:r>
-              <a:t>Results &amp; Diagnostics</a:t>
-            </a:r>
-          </a:p>
-          <a:p>
-            <a:r>
-              <a:t>Interpretation, Limitations, Next Steps</a:t>
+            <a:pPr/>
+            <a:r>
+              <a:t>Goal: explain cross-sectional variation in 1-year S&amp;P 500 returns using technical indicators.</a:t>
+            </a:r>
+          </a:p>
+          <a:p>
+            <a:pPr/>
+            <a:r>
+              <a:t>Dataset: Cam Nugent Kaggle daily prices (2013–2018) covering 500+ tickers.</a:t>
+            </a:r>
+          </a:p>
+          <a:p>
+            <a:pPr/>
+            <a:r>
+              <a:t>Approach: feature engineering + multiple linear regression in R.</a:t>
+            </a:r>
+          </a:p>
+          <a:p>
+            <a:pPr/>
+            <a:r>
+              <a:t>Key result: Model explains 53% of variance; momentum &amp; volatility dominate.</a:t>
+            </a:r>
+          </a:p>
+        </p:txBody>
+      </p:sp>
+      <p:sp>
+        <p:nvSpPr>
+          <p:cNvPr id="4" name="Rectangle 3"/>
+          <p:cNvSpPr/>
+          <p:nvPr/>
+        </p:nvSpPr>
+        <p:spPr>
+          <a:xfrm>
+            <a:off x="0" y="0"/>
+            <a:ext cx="12188952" cy="1097280"/>
+          </a:xfrm>
+          <a:prstGeom prst="rect">
+            <a:avLst/>
+          </a:prstGeom>
+          <a:solidFill>
+            <a:srgbClr val="08347D"/>
+          </a:solidFill>
+          <a:ln>
+            <a:noFill/>
+          </a:ln>
+        </p:spPr>
+        <p:style>
+          <a:lnRef idx="1">
+            <a:schemeClr val="accent1"/>
+          </a:lnRef>
+          <a:fillRef idx="3">
+            <a:schemeClr val="accent1"/>
+          </a:fillRef>
+          <a:effectRef idx="2">
+            <a:schemeClr val="accent1"/>
+          </a:effectRef>
+          <a:fontRef idx="minor">
+            <a:schemeClr val="lt1"/>
+          </a:fontRef>
+        </p:style>
+        <p:txBody>
+          <a:bodyPr rtlCol="0" anchor="ctr"/>
+          <a:lstStyle/>
+          <a:p>
+            <a:r>
+              <a:rPr b="1" sz="2800">
+                <a:solidFill>
+                  <a:srgbClr val="FFFFFF"/>
+                </a:solidFill>
+              </a:rPr>
+              <a:t>Abstract (What did I do?)</a:t>
             </a:r>
           </a:p>
         </p:txBody>
@@ -3919,11 +4545,7 @@
         <p:txBody>
           <a:bodyPr/>
           <a:lstStyle/>
-          <a:p>
-            <a:r>
-              <a:t>Dataset Overview</a:t>
-            </a:r>
-          </a:p>
+          <a:p/>
         </p:txBody>
       </p:sp>
       <p:sp>
@@ -3942,23 +4564,71 @@
           <a:lstStyle/>
           <a:p/>
           <a:p>
-            <a:r>
-              <a:t>Cam Nugent S&amp;P 500 daily price dataset (Kaggle)</a:t>
-            </a:r>
-          </a:p>
-          <a:p>
-            <a:r>
-              <a:t>619k rows, 2013–2018 OHLCV plus ticker name</a:t>
-            </a:r>
-          </a:p>
-          <a:p>
-            <a:r>
-              <a:t>Used trading days in 2017 plus first day of 2018</a:t>
-            </a:r>
-          </a:p>
-          <a:p>
-            <a:r>
-              <a:t>Reproducible via scripts/sp500_regression.R</a:t>
+            <a:pPr/>
+            <a:r>
+              <a:t>Prompt: choose regression topic and present like scientific paper.</a:t>
+            </a:r>
+          </a:p>
+          <a:p>
+            <a:pPr/>
+            <a:r>
+              <a:t>Research question: Which readily available price characteristics predict annual returns?</a:t>
+            </a:r>
+          </a:p>
+          <a:p>
+            <a:pPr/>
+            <a:r>
+              <a:t>Motivation: Provide actionable screening rules for classmates/investors.</a:t>
+            </a:r>
+          </a:p>
+        </p:txBody>
+      </p:sp>
+      <p:sp>
+        <p:nvSpPr>
+          <p:cNvPr id="4" name="Rectangle 3"/>
+          <p:cNvSpPr/>
+          <p:nvPr/>
+        </p:nvSpPr>
+        <p:spPr>
+          <a:xfrm>
+            <a:off x="0" y="0"/>
+            <a:ext cx="12188952" cy="1097280"/>
+          </a:xfrm>
+          <a:prstGeom prst="rect">
+            <a:avLst/>
+          </a:prstGeom>
+          <a:solidFill>
+            <a:srgbClr val="08347D"/>
+          </a:solidFill>
+          <a:ln>
+            <a:noFill/>
+          </a:ln>
+        </p:spPr>
+        <p:style>
+          <a:lnRef idx="1">
+            <a:schemeClr val="accent1"/>
+          </a:lnRef>
+          <a:fillRef idx="3">
+            <a:schemeClr val="accent1"/>
+          </a:fillRef>
+          <a:effectRef idx="2">
+            <a:schemeClr val="accent1"/>
+          </a:effectRef>
+          <a:fontRef idx="minor">
+            <a:schemeClr val="lt1"/>
+          </a:fontRef>
+        </p:style>
+        <p:txBody>
+          <a:bodyPr rtlCol="0" anchor="ctr"/>
+          <a:lstStyle/>
+          <a:p>
+            <a:r>
+              <a:rPr b="1" sz="2800">
+                <a:solidFill>
+                  <a:srgbClr val="FFFFFF"/>
+                </a:solidFill>
+              </a:rPr>
+              <a:t>Introduction (What is the problem?)</a:t>
             </a:r>
           </a:p>
         </p:txBody>
@@ -3995,11 +4665,7 @@
         <p:txBody>
           <a:bodyPr/>
           <a:lstStyle/>
-          <a:p>
-            <a:r>
-              <a:t>Research Question</a:t>
-            </a:r>
-          </a:p>
+          <a:p/>
         </p:txBody>
       </p:sp>
       <p:sp>
@@ -4018,8 +4684,71 @@
           <a:lstStyle/>
           <a:p/>
           <a:p>
-            <a:r>
-              <a:t>Which observable trading characteristics explain cross-sectional variation in 1-year S&amp;P 500 returns?</a:t>
+            <a:pPr/>
+            <a:r>
+              <a:t>Software: R (tidyverse, lubridate, broom) executed via scripts/sp500_regression.R.</a:t>
+            </a:r>
+          </a:p>
+          <a:p>
+            <a:pPr/>
+            <a:r>
+              <a:t>Data cleaning: lower-case columns, parse dates, compute daily log returns.</a:t>
+            </a:r>
+          </a:p>
+          <a:p>
+            <a:pPr/>
+            <a:r>
+              <a:t>Filtered out tickers with &lt;20 trading days in 2017.</a:t>
+            </a:r>
+          </a:p>
+        </p:txBody>
+      </p:sp>
+      <p:sp>
+        <p:nvSpPr>
+          <p:cNvPr id="4" name="Rectangle 3"/>
+          <p:cNvSpPr/>
+          <p:nvPr/>
+        </p:nvSpPr>
+        <p:spPr>
+          <a:xfrm>
+            <a:off x="0" y="0"/>
+            <a:ext cx="12188952" cy="1097280"/>
+          </a:xfrm>
+          <a:prstGeom prst="rect">
+            <a:avLst/>
+          </a:prstGeom>
+          <a:solidFill>
+            <a:srgbClr val="08347D"/>
+          </a:solidFill>
+          <a:ln>
+            <a:noFill/>
+          </a:ln>
+        </p:spPr>
+        <p:style>
+          <a:lnRef idx="1">
+            <a:schemeClr val="accent1"/>
+          </a:lnRef>
+          <a:fillRef idx="3">
+            <a:schemeClr val="accent1"/>
+          </a:fillRef>
+          <a:effectRef idx="2">
+            <a:schemeClr val="accent1"/>
+          </a:effectRef>
+          <a:fontRef idx="minor">
+            <a:schemeClr val="lt1"/>
+          </a:fontRef>
+        </p:style>
+        <p:txBody>
+          <a:bodyPr rtlCol="0" anchor="ctr"/>
+          <a:lstStyle/>
+          <a:p>
+            <a:r>
+              <a:rPr b="1" sz="2800">
+                <a:solidFill>
+                  <a:srgbClr val="FFFFFF"/>
+                </a:solidFill>
+              </a:rPr>
+              <a:t>Materials &amp; Methods (1/2)</a:t>
             </a:r>
           </a:p>
         </p:txBody>
@@ -4056,11 +4785,7 @@
         <p:txBody>
           <a:bodyPr/>
           <a:lstStyle/>
-          <a:p>
-            <a:r>
-              <a:t>Variables</a:t>
-            </a:r>
-          </a:p>
+          <a:p/>
         </p:txBody>
       </p:sp>
       <p:sp>
@@ -4079,28 +4804,71 @@
           <a:lstStyle/>
           <a:p/>
           <a:p>
-            <a:r>
-              <a:t>Response: y_log_return = log(price_2018-01-02 / price_2017-01-03)</a:t>
-            </a:r>
-          </a:p>
-          <a:p>
-            <a:r>
-              <a:t>Volatility: annualized sd of 2017 daily log returns</a:t>
-            </a:r>
-          </a:p>
-          <a:p>
-            <a:r>
-              <a:t>Avg Volume: mean 2017 trading volume in millions</a:t>
-            </a:r>
-          </a:p>
-          <a:p>
-            <a:r>
-              <a:t>Momentum 90: log return over first 90 trading days</a:t>
-            </a:r>
-          </a:p>
-          <a:p>
-            <a:r>
-              <a:t>Trend MA30: slope between Day 1 price and 30-day moving average</a:t>
+            <a:pPr/>
+            <a:r>
+              <a:t>Response: log return from first trading day of 2017 to first day of 2018.</a:t>
+            </a:r>
+          </a:p>
+          <a:p>
+            <a:pPr/>
+            <a:r>
+              <a:t>Predictors: volatility, avg volume, 90-day momentum, 30-day MA trend.</a:t>
+            </a:r>
+          </a:p>
+          <a:p>
+            <a:pPr/>
+            <a:r>
+              <a:t>Model: OLS with assumption checks (linearity, residual diagnostics).</a:t>
+            </a:r>
+          </a:p>
+        </p:txBody>
+      </p:sp>
+      <p:sp>
+        <p:nvSpPr>
+          <p:cNvPr id="4" name="Rectangle 3"/>
+          <p:cNvSpPr/>
+          <p:nvPr/>
+        </p:nvSpPr>
+        <p:spPr>
+          <a:xfrm>
+            <a:off x="0" y="0"/>
+            <a:ext cx="12188952" cy="1097280"/>
+          </a:xfrm>
+          <a:prstGeom prst="rect">
+            <a:avLst/>
+          </a:prstGeom>
+          <a:solidFill>
+            <a:srgbClr val="08347D"/>
+          </a:solidFill>
+          <a:ln>
+            <a:noFill/>
+          </a:ln>
+        </p:spPr>
+        <p:style>
+          <a:lnRef idx="1">
+            <a:schemeClr val="accent1"/>
+          </a:lnRef>
+          <a:fillRef idx="3">
+            <a:schemeClr val="accent1"/>
+          </a:fillRef>
+          <a:effectRef idx="2">
+            <a:schemeClr val="accent1"/>
+          </a:effectRef>
+          <a:fontRef idx="minor">
+            <a:schemeClr val="lt1"/>
+          </a:fontRef>
+        </p:style>
+        <p:txBody>
+          <a:bodyPr rtlCol="0" anchor="ctr"/>
+          <a:lstStyle/>
+          <a:p>
+            <a:r>
+              <a:rPr b="1" sz="2800">
+                <a:solidFill>
+                  <a:srgbClr val="FFFFFF"/>
+                </a:solidFill>
+              </a:rPr>
+              <a:t>Materials &amp; Methods (2/2)</a:t>
             </a:r>
           </a:p>
         </p:txBody>
@@ -4137,11 +4905,7 @@
         <p:txBody>
           <a:bodyPr/>
           <a:lstStyle/>
-          <a:p>
-            <a:r>
-              <a:t>Feature Engineering</a:t>
-            </a:r>
-          </a:p>
+          <a:p/>
         </p:txBody>
       </p:sp>
       <p:sp>
@@ -4160,23 +4924,77 @@
           <a:lstStyle/>
           <a:p/>
           <a:p>
-            <a:r>
-              <a:t>Cleaned columns, parsed dates, sorted by ticker/date</a:t>
-            </a:r>
-          </a:p>
-          <a:p>
-            <a:r>
-              <a:t>Calculated daily log returns and filtered incomplete tickers</a:t>
-            </a:r>
-          </a:p>
-          <a:p>
-            <a:r>
-              <a:t>Summarized 2017 trades to compute predictors</a:t>
-            </a:r>
-          </a:p>
-          <a:p>
-            <a:r>
-              <a:t>Calculated forward-looking log return to 2018 start</a:t>
+            <a:pPr/>
+            <a:r>
+              <a:t>Aggregate 2017 trading info per ticker into a single row.</a:t>
+            </a:r>
+          </a:p>
+          <a:p>
+            <a:pPr/>
+            <a:r>
+              <a:t>Annualize volatility and rescale volume to millions.</a:t>
+            </a:r>
+          </a:p>
+          <a:p>
+            <a:pPr/>
+            <a:r>
+              <a:t>Compute forward-looking response to avoid look-ahead bias.</a:t>
+            </a:r>
+          </a:p>
+          <a:p>
+            <a:pPr/>
+            <a:r>
+              <a:t>Save tidy dataset to data/processed/sp500_features.csv.</a:t>
+            </a:r>
+          </a:p>
+        </p:txBody>
+      </p:sp>
+      <p:sp>
+        <p:nvSpPr>
+          <p:cNvPr id="4" name="Rectangle 3"/>
+          <p:cNvSpPr/>
+          <p:nvPr/>
+        </p:nvSpPr>
+        <p:spPr>
+          <a:xfrm>
+            <a:off x="0" y="0"/>
+            <a:ext cx="12188952" cy="1097280"/>
+          </a:xfrm>
+          <a:prstGeom prst="rect">
+            <a:avLst/>
+          </a:prstGeom>
+          <a:solidFill>
+            <a:srgbClr val="08347D"/>
+          </a:solidFill>
+          <a:ln>
+            <a:noFill/>
+          </a:ln>
+        </p:spPr>
+        <p:style>
+          <a:lnRef idx="1">
+            <a:schemeClr val="accent1"/>
+          </a:lnRef>
+          <a:fillRef idx="3">
+            <a:schemeClr val="accent1"/>
+          </a:fillRef>
+          <a:effectRef idx="2">
+            <a:schemeClr val="accent1"/>
+          </a:effectRef>
+          <a:fontRef idx="minor">
+            <a:schemeClr val="lt1"/>
+          </a:fontRef>
+        </p:style>
+        <p:txBody>
+          <a:bodyPr rtlCol="0" anchor="ctr"/>
+          <a:lstStyle/>
+          <a:p>
+            <a:r>
+              <a:rPr b="1" sz="2800">
+                <a:solidFill>
+                  <a:srgbClr val="FFFFFF"/>
+                </a:solidFill>
+              </a:rPr>
+              <a:t>Feature Engineering Workflow</a:t>
             </a:r>
           </a:p>
         </p:txBody>
@@ -4213,11 +5031,7 @@
         <p:txBody>
           <a:bodyPr/>
           <a:lstStyle/>
-          <a:p>
-            <a:r>
-              <a:t>Modeling Approach</a:t>
-            </a:r>
-          </a:p>
+          <a:p/>
         </p:txBody>
       </p:sp>
       <p:sp>
@@ -4235,19 +5049,101 @@
           <a:bodyPr/>
           <a:lstStyle/>
           <a:p/>
-          <a:p>
-            <a:r>
-              <a:t>OLS: y_log_return ~ volatility + avg_volume_mln + momentum_90 + trend_ma30</a:t>
-            </a:r>
-          </a:p>
-          <a:p>
-            <a:r>
-              <a:t>Assumptions checked with residual vs fitted and Q-Q plots</a:t>
-            </a:r>
-          </a:p>
-          <a:p>
-            <a:r>
-              <a:t>Outputs saved (coefficients, metrics, residuals)</a:t>
+        </p:txBody>
+      </p:sp>
+      <p:sp>
+        <p:nvSpPr>
+          <p:cNvPr id="4" name="Rectangle 3"/>
+          <p:cNvSpPr/>
+          <p:nvPr/>
+        </p:nvSpPr>
+        <p:spPr>
+          <a:xfrm>
+            <a:off x="0" y="0"/>
+            <a:ext cx="12188952" cy="1097280"/>
+          </a:xfrm>
+          <a:prstGeom prst="rect">
+            <a:avLst/>
+          </a:prstGeom>
+          <a:solidFill>
+            <a:srgbClr val="08347D"/>
+          </a:solidFill>
+          <a:ln>
+            <a:noFill/>
+          </a:ln>
+        </p:spPr>
+        <p:style>
+          <a:lnRef idx="1">
+            <a:schemeClr val="accent1"/>
+          </a:lnRef>
+          <a:fillRef idx="3">
+            <a:schemeClr val="accent1"/>
+          </a:fillRef>
+          <a:effectRef idx="2">
+            <a:schemeClr val="accent1"/>
+          </a:effectRef>
+          <a:fontRef idx="minor">
+            <a:schemeClr val="lt1"/>
+          </a:fontRef>
+        </p:style>
+        <p:txBody>
+          <a:bodyPr rtlCol="0" anchor="ctr"/>
+          <a:lstStyle/>
+          <a:p>
+            <a:r>
+              <a:rPr b="1" sz="2800">
+                <a:solidFill>
+                  <a:srgbClr val="FFFFFF"/>
+                </a:solidFill>
+              </a:rPr>
+              <a:t>Experimental Design Diagram</a:t>
+            </a:r>
+          </a:p>
+        </p:txBody>
+      </p:sp>
+      <p:sp>
+        <p:nvSpPr>
+          <p:cNvPr id="5" name="Octagon 4"/>
+          <p:cNvSpPr/>
+          <p:nvPr/>
+        </p:nvSpPr>
+        <p:spPr>
+          <a:xfrm>
+            <a:off x="914400" y="1463040"/>
+            <a:ext cx="7772400" cy="3200400"/>
+          </a:xfrm>
+          <a:prstGeom prst="octagon">
+            <a:avLst/>
+          </a:prstGeom>
+          <a:solidFill>
+            <a:srgbClr val="F0F5FF"/>
+          </a:solidFill>
+        </p:spPr>
+        <p:style>
+          <a:lnRef idx="1">
+            <a:schemeClr val="accent1"/>
+          </a:lnRef>
+          <a:fillRef idx="3">
+            <a:schemeClr val="accent1"/>
+          </a:fillRef>
+          <a:effectRef idx="2">
+            <a:schemeClr val="accent1"/>
+          </a:effectRef>
+          <a:fontRef idx="minor">
+            <a:schemeClr val="lt1"/>
+          </a:fontRef>
+        </p:style>
+        <p:txBody>
+          <a:bodyPr rtlCol="0" anchor="ctr"/>
+          <a:lstStyle/>
+          <a:p>
+            <a:r>
+              <a:rPr sz="2000">
+                <a:solidFill>
+                  <a:srgbClr val="0F192D"/>
+                </a:solidFill>
+              </a:rPr>
+              <a:t>Pipeline: Raw Kaggle CSV → Clean Daily Prices → Feature Summary per Ticker → Regression Model → Diagnostics &amp; Slides</a:t>
             </a:r>
           </a:p>
         </p:txBody>
@@ -4284,24 +5180,70 @@
         <p:txBody>
           <a:bodyPr/>
           <a:lstStyle/>
-          <a:p>
-            <a:r>
-              <a:t>Summary Statistics</a:t>
+          <a:p/>
+        </p:txBody>
+      </p:sp>
+      <p:sp>
+        <p:nvSpPr>
+          <p:cNvPr id="3" name="Rectangle 2"/>
+          <p:cNvSpPr/>
+          <p:nvPr/>
+        </p:nvSpPr>
+        <p:spPr>
+          <a:xfrm>
+            <a:off x="0" y="0"/>
+            <a:ext cx="12188952" cy="1097280"/>
+          </a:xfrm>
+          <a:prstGeom prst="rect">
+            <a:avLst/>
+          </a:prstGeom>
+          <a:solidFill>
+            <a:srgbClr val="08347D"/>
+          </a:solidFill>
+          <a:ln>
+            <a:noFill/>
+          </a:ln>
+        </p:spPr>
+        <p:style>
+          <a:lnRef idx="1">
+            <a:schemeClr val="accent1"/>
+          </a:lnRef>
+          <a:fillRef idx="3">
+            <a:schemeClr val="accent1"/>
+          </a:fillRef>
+          <a:effectRef idx="2">
+            <a:schemeClr val="accent1"/>
+          </a:effectRef>
+          <a:fontRef idx="minor">
+            <a:schemeClr val="lt1"/>
+          </a:fontRef>
+        </p:style>
+        <p:txBody>
+          <a:bodyPr rtlCol="0" anchor="ctr"/>
+          <a:lstStyle/>
+          <a:p>
+            <a:r>
+              <a:rPr b="1" sz="2800">
+                <a:solidFill>
+                  <a:srgbClr val="FFFFFF"/>
+                </a:solidFill>
+              </a:rPr>
+              <a:t>Results: Descriptive Statistics</a:t>
             </a:r>
           </a:p>
         </p:txBody>
       </p:sp>
       <p:graphicFrame>
         <p:nvGraphicFramePr>
-          <p:cNvPr id="3" name="Table 2"/>
+          <p:cNvPr id="4" name="Table 3"/>
           <p:cNvGraphicFramePr>
             <a:graphicFrameLocks noGrp="1"/>
           </p:cNvGraphicFramePr>
           <p:nvPr/>
         </p:nvGraphicFramePr>
         <p:xfrm>
-          <a:off x="640080" y="1554480"/>
-          <a:ext cx="7498079" cy="3291840"/>
+          <a:off x="640080" y="1463040"/>
+          <a:ext cx="7498079" cy="3474720"/>
         </p:xfrm>
         <a:graphic>
           <a:graphicData uri="http://schemas.openxmlformats.org/drawingml/2006/table">
@@ -4313,7 +5255,7 @@
                 <a:gridCol w="3749039"/>
                 <a:gridCol w="3749040"/>
               </a:tblGrid>
-              <a:tr h="548640">
+              <a:tr h="579120">
                 <a:tc>
                   <a:txBody>
                     <a:bodyPr/>
@@ -4339,14 +5281,14 @@
                   <a:tcPr/>
                 </a:tc>
               </a:tr>
-              <a:tr h="548640">
+              <a:tr h="579120">
                 <a:tc>
                   <a:txBody>
                     <a:bodyPr/>
                     <a:lstStyle/>
                     <a:p>
                       <a:r>
-                        <a:t>Ticker Count</a:t>
+                        <a:t>Tickers (n)</a:t>
                       </a:r>
                     </a:p>
                   </a:txBody>
@@ -4365,14 +5307,14 @@
                   <a:tcPr/>
                 </a:tc>
               </a:tr>
-              <a:tr h="548640">
+              <a:tr h="579120">
                 <a:tc>
                   <a:txBody>
                     <a:bodyPr/>
                     <a:lstStyle/>
                     <a:p>
                       <a:r>
-                        <a:t>Mean 1Y Log Return</a:t>
+                        <a:t>Mean 1Y log return</a:t>
                       </a:r>
                     </a:p>
                   </a:txBody>
@@ -4391,14 +5333,14 @@
                   <a:tcPr/>
                 </a:tc>
               </a:tr>
-              <a:tr h="548640">
+              <a:tr h="579120">
                 <a:tc>
                   <a:txBody>
                     <a:bodyPr/>
                     <a:lstStyle/>
                     <a:p>
                       <a:r>
-                        <a:t>Median Volatility</a:t>
+                        <a:t>Median volatility</a:t>
                       </a:r>
                     </a:p>
                   </a:txBody>
@@ -4417,14 +5359,14 @@
                   <a:tcPr/>
                 </a:tc>
               </a:tr>
-              <a:tr h="548640">
+              <a:tr h="579120">
                 <a:tc>
                   <a:txBody>
                     <a:bodyPr/>
                     <a:lstStyle/>
                     <a:p>
                       <a:r>
-                        <a:t>Median Avg Volume (M)</a:t>
+                        <a:t>Median avg volume (M)</a:t>
                       </a:r>
                     </a:p>
                   </a:txBody>
@@ -4443,7 +5385,7 @@
                   <a:tcPr/>
                 </a:tc>
               </a:tr>
-              <a:tr h="548640">
+              <a:tr h="579120">
                 <a:tc>
                   <a:txBody>
                     <a:bodyPr/>
@@ -4505,11 +5447,7 @@
         <p:txBody>
           <a:bodyPr/>
           <a:lstStyle/>
-          <a:p>
-            <a:r>
-              <a:t>Model Fit</a:t>
-            </a:r>
-          </a:p>
+          <a:p/>
         </p:txBody>
       </p:sp>
       <p:sp>
@@ -4529,7 +5467,7 @@
           <a:p/>
           <a:p>
             <a:r>
-              <a:t>R² = 0.529, Adjusted R² = 0.525</a:t>
+              <a:t>R² = 0.529 (Adj = 0.525)</a:t>
             </a:r>
           </a:p>
           <a:p>
@@ -4539,12 +5477,62 @@
           </a:p>
           <a:p>
             <a:r>
-              <a:t>F-statistic = 139.7 (p = 5.5e-80)</a:t>
-            </a:r>
-          </a:p>
-          <a:p>
-            <a:r>
-              <a:t>Observations = 503</a:t>
+              <a:t>F-statistic = 139.7 | p = 5.5e-80</a:t>
+            </a:r>
+          </a:p>
+          <a:p>
+            <a:r>
+              <a:t>n = 503 tickers</a:t>
+            </a:r>
+          </a:p>
+        </p:txBody>
+      </p:sp>
+      <p:sp>
+        <p:nvSpPr>
+          <p:cNvPr id="4" name="Rectangle 3"/>
+          <p:cNvSpPr/>
+          <p:nvPr/>
+        </p:nvSpPr>
+        <p:spPr>
+          <a:xfrm>
+            <a:off x="0" y="0"/>
+            <a:ext cx="12188952" cy="1097280"/>
+          </a:xfrm>
+          <a:prstGeom prst="rect">
+            <a:avLst/>
+          </a:prstGeom>
+          <a:solidFill>
+            <a:srgbClr val="08347D"/>
+          </a:solidFill>
+          <a:ln>
+            <a:noFill/>
+          </a:ln>
+        </p:spPr>
+        <p:style>
+          <a:lnRef idx="1">
+            <a:schemeClr val="accent1"/>
+          </a:lnRef>
+          <a:fillRef idx="3">
+            <a:schemeClr val="accent1"/>
+          </a:fillRef>
+          <a:effectRef idx="2">
+            <a:schemeClr val="accent1"/>
+          </a:effectRef>
+          <a:fontRef idx="minor">
+            <a:schemeClr val="lt1"/>
+          </a:fontRef>
+        </p:style>
+        <p:txBody>
+          <a:bodyPr rtlCol="0" anchor="ctr"/>
+          <a:lstStyle/>
+          <a:p>
+            <a:r>
+              <a:rPr b="1" sz="2800">
+                <a:solidFill>
+                  <a:srgbClr val="FFFFFF"/>
+                </a:solidFill>
+              </a:rPr>
+              <a:t>Results: Model Fit</a:t>
             </a:r>
           </a:p>
         </p:txBody>

</xml_diff>